<commit_message>
Curso de Git & GitHub » Aula 07 - Comandos básicos do git (geração de pdf)
</commit_message>
<xml_diff>
--- a/Curso de Git & GitHub/Apresentações/Power Point/Curso de Git & GitHub » Aula 07 - Comandos básicos do git.pptx
+++ b/Curso de Git & GitHub/Apresentações/Power Point/Curso de Git & GitHub » Aula 07 - Comandos básicos do git.pptx
@@ -389,7 +389,7 @@
           <a:p>
             <a:fld id="{9B10D6CF-6099-4B27-AAA5-4A24AACA45B1}" type="datetimeFigureOut">
               <a:rPr lang="pt-BR" smtClean="0"/>
-              <a:t>16/02/2021</a:t>
+              <a:t>02/07/2021</a:t>
             </a:fld>
             <a:endParaRPr lang="pt-BR" dirty="0"/>
           </a:p>
@@ -554,7 +554,7 @@
           <a:p>
             <a:fld id="{30CA822D-E58E-41A4-839D-F5BF7D683320}" type="datetimeFigureOut">
               <a:rPr lang="pt-BR" smtClean="0"/>
-              <a:t>16/02/2021</a:t>
+              <a:t>02/07/2021</a:t>
             </a:fld>
             <a:endParaRPr lang="pt-BR" dirty="0"/>
           </a:p>
@@ -1126,7 +1126,7 @@
           <a:p>
             <a:fld id="{F72AEF3B-AD3D-4C07-B255-57037BF73F56}" type="datetimeFigureOut">
               <a:rPr lang="pt-BR" smtClean="0"/>
-              <a:t>16/02/2021</a:t>
+              <a:t>02/07/2021</a:t>
             </a:fld>
             <a:endParaRPr lang="pt-BR" dirty="0"/>
           </a:p>
@@ -1296,7 +1296,7 @@
           <a:p>
             <a:fld id="{F72AEF3B-AD3D-4C07-B255-57037BF73F56}" type="datetimeFigureOut">
               <a:rPr lang="pt-BR" smtClean="0"/>
-              <a:t>16/02/2021</a:t>
+              <a:t>02/07/2021</a:t>
             </a:fld>
             <a:endParaRPr lang="pt-BR" dirty="0"/>
           </a:p>
@@ -1476,7 +1476,7 @@
           <a:p>
             <a:fld id="{F72AEF3B-AD3D-4C07-B255-57037BF73F56}" type="datetimeFigureOut">
               <a:rPr lang="pt-BR" smtClean="0"/>
-              <a:t>16/02/2021</a:t>
+              <a:t>02/07/2021</a:t>
             </a:fld>
             <a:endParaRPr lang="pt-BR" dirty="0"/>
           </a:p>
@@ -1646,7 +1646,7 @@
           <a:p>
             <a:fld id="{F72AEF3B-AD3D-4C07-B255-57037BF73F56}" type="datetimeFigureOut">
               <a:rPr lang="pt-BR" smtClean="0"/>
-              <a:t>16/02/2021</a:t>
+              <a:t>02/07/2021</a:t>
             </a:fld>
             <a:endParaRPr lang="pt-BR" dirty="0"/>
           </a:p>
@@ -1892,7 +1892,7 @@
           <a:p>
             <a:fld id="{F72AEF3B-AD3D-4C07-B255-57037BF73F56}" type="datetimeFigureOut">
               <a:rPr lang="pt-BR" smtClean="0"/>
-              <a:t>16/02/2021</a:t>
+              <a:t>02/07/2021</a:t>
             </a:fld>
             <a:endParaRPr lang="pt-BR" dirty="0"/>
           </a:p>
@@ -2124,7 +2124,7 @@
           <a:p>
             <a:fld id="{F72AEF3B-AD3D-4C07-B255-57037BF73F56}" type="datetimeFigureOut">
               <a:rPr lang="pt-BR" smtClean="0"/>
-              <a:t>16/02/2021</a:t>
+              <a:t>02/07/2021</a:t>
             </a:fld>
             <a:endParaRPr lang="pt-BR" dirty="0"/>
           </a:p>
@@ -2491,7 +2491,7 @@
           <a:p>
             <a:fld id="{F72AEF3B-AD3D-4C07-B255-57037BF73F56}" type="datetimeFigureOut">
               <a:rPr lang="pt-BR" smtClean="0"/>
-              <a:t>16/02/2021</a:t>
+              <a:t>02/07/2021</a:t>
             </a:fld>
             <a:endParaRPr lang="pt-BR" dirty="0"/>
           </a:p>
@@ -2609,7 +2609,7 @@
           <a:p>
             <a:fld id="{F72AEF3B-AD3D-4C07-B255-57037BF73F56}" type="datetimeFigureOut">
               <a:rPr lang="pt-BR" smtClean="0"/>
-              <a:t>16/02/2021</a:t>
+              <a:t>02/07/2021</a:t>
             </a:fld>
             <a:endParaRPr lang="pt-BR" dirty="0"/>
           </a:p>
@@ -2704,7 +2704,7 @@
           <a:p>
             <a:fld id="{F72AEF3B-AD3D-4C07-B255-57037BF73F56}" type="datetimeFigureOut">
               <a:rPr lang="pt-BR" smtClean="0"/>
-              <a:t>16/02/2021</a:t>
+              <a:t>02/07/2021</a:t>
             </a:fld>
             <a:endParaRPr lang="pt-BR" dirty="0"/>
           </a:p>
@@ -2981,7 +2981,7 @@
           <a:p>
             <a:fld id="{F72AEF3B-AD3D-4C07-B255-57037BF73F56}" type="datetimeFigureOut">
               <a:rPr lang="pt-BR" smtClean="0"/>
-              <a:t>16/02/2021</a:t>
+              <a:t>02/07/2021</a:t>
             </a:fld>
             <a:endParaRPr lang="pt-BR" dirty="0"/>
           </a:p>
@@ -3238,7 +3238,7 @@
           <a:p>
             <a:fld id="{F72AEF3B-AD3D-4C07-B255-57037BF73F56}" type="datetimeFigureOut">
               <a:rPr lang="pt-BR" smtClean="0"/>
-              <a:t>16/02/2021</a:t>
+              <a:t>02/07/2021</a:t>
             </a:fld>
             <a:endParaRPr lang="pt-BR" dirty="0"/>
           </a:p>
@@ -3451,7 +3451,7 @@
           <a:p>
             <a:fld id="{F72AEF3B-AD3D-4C07-B255-57037BF73F56}" type="datetimeFigureOut">
               <a:rPr lang="pt-BR" smtClean="0"/>
-              <a:t>16/02/2021</a:t>
+              <a:t>02/07/2021</a:t>
             </a:fld>
             <a:endParaRPr lang="pt-BR" dirty="0"/>
           </a:p>

</xml_diff>